<commit_message>
Präsentation; HandOut zusammengefügt und formatiert
Bitte noch einmal auf Fehler kontrollieren, habe deine letzten
Änderungen in Datenbanken noch nicht drin
</commit_message>
<xml_diff>
--- a/Dokumente/Referat/Präsentation.pptx
+++ b/Dokumente/Referat/Präsentation.pptx
@@ -4,6 +4,9 @@
   <p:sldMasterIdLst>
     <p:sldMasterId id="2147483678" r:id="rId1"/>
   </p:sldMasterIdLst>
+  <p:notesMasterIdLst>
+    <p:notesMasterId r:id="rId17"/>
+  </p:notesMasterIdLst>
   <p:sldIdLst>
     <p:sldId id="256" r:id="rId2"/>
     <p:sldId id="257" r:id="rId3"/>
@@ -11,6 +14,15 @@
     <p:sldId id="259" r:id="rId5"/>
     <p:sldId id="260" r:id="rId6"/>
     <p:sldId id="261" r:id="rId7"/>
+    <p:sldId id="262" r:id="rId8"/>
+    <p:sldId id="263" r:id="rId9"/>
+    <p:sldId id="264" r:id="rId10"/>
+    <p:sldId id="265" r:id="rId11"/>
+    <p:sldId id="266" r:id="rId12"/>
+    <p:sldId id="267" r:id="rId13"/>
+    <p:sldId id="268" r:id="rId14"/>
+    <p:sldId id="269" r:id="rId15"/>
+    <p:sldId id="270" r:id="rId16"/>
   </p:sldIdLst>
   <p:sldSz cx="12192000" cy="6858000"/>
   <p:notesSz cx="6858000" cy="9144000"/>
@@ -109,7 +121,508 @@
       </a:defRPr>
     </a:lvl9pPr>
   </p:defaultTextStyle>
+  <p:extLst>
+    <p:ext uri="{EFAFB233-063F-42B5-8137-9DF3F51BA10A}">
+      <p15:sldGuideLst xmlns:p15="http://schemas.microsoft.com/office/powerpoint/2012/main"/>
+    </p:ext>
+  </p:extLst>
 </p:presentation>
+</file>
+
+<file path=ppt/notesMasters/notesMaster1.xml><?xml version="1.0" encoding="utf-8"?>
+<p:notesMaster xmlns:a="http://schemas.openxmlformats.org/drawingml/2006/main" xmlns:r="http://schemas.openxmlformats.org/officeDocument/2006/relationships" xmlns:p="http://schemas.openxmlformats.org/presentationml/2006/main">
+  <p:cSld>
+    <p:bg>
+      <p:bgRef idx="1001">
+        <a:schemeClr val="bg1"/>
+      </p:bgRef>
+    </p:bg>
+    <p:spTree>
+      <p:nvGrpSpPr>
+        <p:cNvPr id="1" name=""/>
+        <p:cNvGrpSpPr/>
+        <p:nvPr/>
+      </p:nvGrpSpPr>
+      <p:grpSpPr>
+        <a:xfrm>
+          <a:off x="0" y="0"/>
+          <a:ext cx="0" cy="0"/>
+          <a:chOff x="0" y="0"/>
+          <a:chExt cx="0" cy="0"/>
+        </a:xfrm>
+      </p:grpSpPr>
+      <p:sp>
+        <p:nvSpPr>
+          <p:cNvPr id="2" name="Kopfzeilenplatzhalter 1"/>
+          <p:cNvSpPr>
+            <a:spLocks noGrp="1"/>
+          </p:cNvSpPr>
+          <p:nvPr>
+            <p:ph type="hdr" sz="quarter"/>
+          </p:nvPr>
+        </p:nvSpPr>
+        <p:spPr>
+          <a:xfrm>
+            <a:off x="0" y="0"/>
+            <a:ext cx="2971800" cy="458788"/>
+          </a:xfrm>
+          <a:prstGeom prst="rect">
+            <a:avLst/>
+          </a:prstGeom>
+        </p:spPr>
+        <p:txBody>
+          <a:bodyPr vert="horz" lIns="91440" tIns="45720" rIns="91440" bIns="45720" rtlCol="0"/>
+          <a:lstStyle>
+            <a:lvl1pPr algn="l">
+              <a:defRPr sz="1200"/>
+            </a:lvl1pPr>
+          </a:lstStyle>
+          <a:p>
+            <a:endParaRPr lang="de-AT"/>
+          </a:p>
+        </p:txBody>
+      </p:sp>
+      <p:sp>
+        <p:nvSpPr>
+          <p:cNvPr id="3" name="Datumsplatzhalter 2"/>
+          <p:cNvSpPr>
+            <a:spLocks noGrp="1"/>
+          </p:cNvSpPr>
+          <p:nvPr>
+            <p:ph type="dt" idx="1"/>
+          </p:nvPr>
+        </p:nvSpPr>
+        <p:spPr>
+          <a:xfrm>
+            <a:off x="3884613" y="0"/>
+            <a:ext cx="2971800" cy="458788"/>
+          </a:xfrm>
+          <a:prstGeom prst="rect">
+            <a:avLst/>
+          </a:prstGeom>
+        </p:spPr>
+        <p:txBody>
+          <a:bodyPr vert="horz" lIns="91440" tIns="45720" rIns="91440" bIns="45720" rtlCol="0"/>
+          <a:lstStyle>
+            <a:lvl1pPr algn="r">
+              <a:defRPr sz="1200"/>
+            </a:lvl1pPr>
+          </a:lstStyle>
+          <a:p>
+            <a:fld id="{414BA96B-CCB3-486B-8E6D-702C2D66FDB9}" type="datetimeFigureOut">
+              <a:rPr lang="de-AT" smtClean="0"/>
+              <a:t>17.12.2014</a:t>
+            </a:fld>
+            <a:endParaRPr lang="de-AT"/>
+          </a:p>
+        </p:txBody>
+      </p:sp>
+      <p:sp>
+        <p:nvSpPr>
+          <p:cNvPr id="4" name="Folienbildplatzhalter 3"/>
+          <p:cNvSpPr>
+            <a:spLocks noGrp="1" noRot="1" noChangeAspect="1"/>
+          </p:cNvSpPr>
+          <p:nvPr>
+            <p:ph type="sldImg" idx="2"/>
+          </p:nvPr>
+        </p:nvSpPr>
+        <p:spPr>
+          <a:xfrm>
+            <a:off x="685800" y="1143000"/>
+            <a:ext cx="5486400" cy="3086100"/>
+          </a:xfrm>
+          <a:prstGeom prst="rect">
+            <a:avLst/>
+          </a:prstGeom>
+          <a:noFill/>
+          <a:ln w="12700">
+            <a:solidFill>
+              <a:prstClr val="black"/>
+            </a:solidFill>
+          </a:ln>
+        </p:spPr>
+        <p:txBody>
+          <a:bodyPr vert="horz" lIns="91440" tIns="45720" rIns="91440" bIns="45720" rtlCol="0" anchor="ctr"/>
+          <a:lstStyle/>
+          <a:p>
+            <a:endParaRPr lang="de-AT"/>
+          </a:p>
+        </p:txBody>
+      </p:sp>
+      <p:sp>
+        <p:nvSpPr>
+          <p:cNvPr id="5" name="Notizenplatzhalter 4"/>
+          <p:cNvSpPr>
+            <a:spLocks noGrp="1"/>
+          </p:cNvSpPr>
+          <p:nvPr>
+            <p:ph type="body" sz="quarter" idx="3"/>
+          </p:nvPr>
+        </p:nvSpPr>
+        <p:spPr>
+          <a:xfrm>
+            <a:off x="685800" y="4400550"/>
+            <a:ext cx="5486400" cy="3600450"/>
+          </a:xfrm>
+          <a:prstGeom prst="rect">
+            <a:avLst/>
+          </a:prstGeom>
+        </p:spPr>
+        <p:txBody>
+          <a:bodyPr vert="horz" lIns="91440" tIns="45720" rIns="91440" bIns="45720" rtlCol="0"/>
+          <a:lstStyle/>
+          <a:p>
+            <a:pPr lvl="0"/>
+            <a:r>
+              <a:rPr lang="de-DE" smtClean="0"/>
+              <a:t>Textmasterformat bearbeiten</a:t>
+            </a:r>
+          </a:p>
+          <a:p>
+            <a:pPr lvl="1"/>
+            <a:r>
+              <a:rPr lang="de-DE" smtClean="0"/>
+              <a:t>Zweite Ebene</a:t>
+            </a:r>
+          </a:p>
+          <a:p>
+            <a:pPr lvl="2"/>
+            <a:r>
+              <a:rPr lang="de-DE" smtClean="0"/>
+              <a:t>Dritte Ebene</a:t>
+            </a:r>
+          </a:p>
+          <a:p>
+            <a:pPr lvl="3"/>
+            <a:r>
+              <a:rPr lang="de-DE" smtClean="0"/>
+              <a:t>Vierte Ebene</a:t>
+            </a:r>
+          </a:p>
+          <a:p>
+            <a:pPr lvl="4"/>
+            <a:r>
+              <a:rPr lang="de-DE" smtClean="0"/>
+              <a:t>Fünfte Ebene</a:t>
+            </a:r>
+            <a:endParaRPr lang="de-AT"/>
+          </a:p>
+        </p:txBody>
+      </p:sp>
+      <p:sp>
+        <p:nvSpPr>
+          <p:cNvPr id="6" name="Fußzeilenplatzhalter 5"/>
+          <p:cNvSpPr>
+            <a:spLocks noGrp="1"/>
+          </p:cNvSpPr>
+          <p:nvPr>
+            <p:ph type="ftr" sz="quarter" idx="4"/>
+          </p:nvPr>
+        </p:nvSpPr>
+        <p:spPr>
+          <a:xfrm>
+            <a:off x="0" y="8685213"/>
+            <a:ext cx="2971800" cy="458787"/>
+          </a:xfrm>
+          <a:prstGeom prst="rect">
+            <a:avLst/>
+          </a:prstGeom>
+        </p:spPr>
+        <p:txBody>
+          <a:bodyPr vert="horz" lIns="91440" tIns="45720" rIns="91440" bIns="45720" rtlCol="0" anchor="b"/>
+          <a:lstStyle>
+            <a:lvl1pPr algn="l">
+              <a:defRPr sz="1200"/>
+            </a:lvl1pPr>
+          </a:lstStyle>
+          <a:p>
+            <a:endParaRPr lang="de-AT"/>
+          </a:p>
+        </p:txBody>
+      </p:sp>
+      <p:sp>
+        <p:nvSpPr>
+          <p:cNvPr id="7" name="Foliennummernplatzhalter 6"/>
+          <p:cNvSpPr>
+            <a:spLocks noGrp="1"/>
+          </p:cNvSpPr>
+          <p:nvPr>
+            <p:ph type="sldNum" sz="quarter" idx="5"/>
+          </p:nvPr>
+        </p:nvSpPr>
+        <p:spPr>
+          <a:xfrm>
+            <a:off x="3884613" y="8685213"/>
+            <a:ext cx="2971800" cy="458787"/>
+          </a:xfrm>
+          <a:prstGeom prst="rect">
+            <a:avLst/>
+          </a:prstGeom>
+        </p:spPr>
+        <p:txBody>
+          <a:bodyPr vert="horz" lIns="91440" tIns="45720" rIns="91440" bIns="45720" rtlCol="0" anchor="b"/>
+          <a:lstStyle>
+            <a:lvl1pPr algn="r">
+              <a:defRPr sz="1200"/>
+            </a:lvl1pPr>
+          </a:lstStyle>
+          <a:p>
+            <a:fld id="{40443D88-C795-4A05-8385-807CDE274C8A}" type="slidenum">
+              <a:rPr lang="de-AT" smtClean="0"/>
+              <a:t>‹Nr.›</a:t>
+            </a:fld>
+            <a:endParaRPr lang="de-AT"/>
+          </a:p>
+        </p:txBody>
+      </p:sp>
+    </p:spTree>
+    <p:extLst>
+      <p:ext uri="{BB962C8B-B14F-4D97-AF65-F5344CB8AC3E}">
+        <p14:creationId xmlns:p14="http://schemas.microsoft.com/office/powerpoint/2010/main" val="2101029934"/>
+      </p:ext>
+    </p:extLst>
+  </p:cSld>
+  <p:clrMap bg1="lt1" tx1="dk1" bg2="lt2" tx2="dk2" accent1="accent1" accent2="accent2" accent3="accent3" accent4="accent4" accent5="accent5" accent6="accent6" hlink="hlink" folHlink="folHlink"/>
+  <p:notesStyle>
+    <a:lvl1pPr marL="0" algn="l" defTabSz="914400" rtl="0" eaLnBrk="1" latinLnBrk="0" hangingPunct="1">
+      <a:defRPr sz="1200" kern="1200">
+        <a:solidFill>
+          <a:schemeClr val="tx1"/>
+        </a:solidFill>
+        <a:latin typeface="+mn-lt"/>
+        <a:ea typeface="+mn-ea"/>
+        <a:cs typeface="+mn-cs"/>
+      </a:defRPr>
+    </a:lvl1pPr>
+    <a:lvl2pPr marL="457200" algn="l" defTabSz="914400" rtl="0" eaLnBrk="1" latinLnBrk="0" hangingPunct="1">
+      <a:defRPr sz="1200" kern="1200">
+        <a:solidFill>
+          <a:schemeClr val="tx1"/>
+        </a:solidFill>
+        <a:latin typeface="+mn-lt"/>
+        <a:ea typeface="+mn-ea"/>
+        <a:cs typeface="+mn-cs"/>
+      </a:defRPr>
+    </a:lvl2pPr>
+    <a:lvl3pPr marL="914400" algn="l" defTabSz="914400" rtl="0" eaLnBrk="1" latinLnBrk="0" hangingPunct="1">
+      <a:defRPr sz="1200" kern="1200">
+        <a:solidFill>
+          <a:schemeClr val="tx1"/>
+        </a:solidFill>
+        <a:latin typeface="+mn-lt"/>
+        <a:ea typeface="+mn-ea"/>
+        <a:cs typeface="+mn-cs"/>
+      </a:defRPr>
+    </a:lvl3pPr>
+    <a:lvl4pPr marL="1371600" algn="l" defTabSz="914400" rtl="0" eaLnBrk="1" latinLnBrk="0" hangingPunct="1">
+      <a:defRPr sz="1200" kern="1200">
+        <a:solidFill>
+          <a:schemeClr val="tx1"/>
+        </a:solidFill>
+        <a:latin typeface="+mn-lt"/>
+        <a:ea typeface="+mn-ea"/>
+        <a:cs typeface="+mn-cs"/>
+      </a:defRPr>
+    </a:lvl4pPr>
+    <a:lvl5pPr marL="1828800" algn="l" defTabSz="914400" rtl="0" eaLnBrk="1" latinLnBrk="0" hangingPunct="1">
+      <a:defRPr sz="1200" kern="1200">
+        <a:solidFill>
+          <a:schemeClr val="tx1"/>
+        </a:solidFill>
+        <a:latin typeface="+mn-lt"/>
+        <a:ea typeface="+mn-ea"/>
+        <a:cs typeface="+mn-cs"/>
+      </a:defRPr>
+    </a:lvl5pPr>
+    <a:lvl6pPr marL="2286000" algn="l" defTabSz="914400" rtl="0" eaLnBrk="1" latinLnBrk="0" hangingPunct="1">
+      <a:defRPr sz="1200" kern="1200">
+        <a:solidFill>
+          <a:schemeClr val="tx1"/>
+        </a:solidFill>
+        <a:latin typeface="+mn-lt"/>
+        <a:ea typeface="+mn-ea"/>
+        <a:cs typeface="+mn-cs"/>
+      </a:defRPr>
+    </a:lvl6pPr>
+    <a:lvl7pPr marL="2743200" algn="l" defTabSz="914400" rtl="0" eaLnBrk="1" latinLnBrk="0" hangingPunct="1">
+      <a:defRPr sz="1200" kern="1200">
+        <a:solidFill>
+          <a:schemeClr val="tx1"/>
+        </a:solidFill>
+        <a:latin typeface="+mn-lt"/>
+        <a:ea typeface="+mn-ea"/>
+        <a:cs typeface="+mn-cs"/>
+      </a:defRPr>
+    </a:lvl7pPr>
+    <a:lvl8pPr marL="3200400" algn="l" defTabSz="914400" rtl="0" eaLnBrk="1" latinLnBrk="0" hangingPunct="1">
+      <a:defRPr sz="1200" kern="1200">
+        <a:solidFill>
+          <a:schemeClr val="tx1"/>
+        </a:solidFill>
+        <a:latin typeface="+mn-lt"/>
+        <a:ea typeface="+mn-ea"/>
+        <a:cs typeface="+mn-cs"/>
+      </a:defRPr>
+    </a:lvl8pPr>
+    <a:lvl9pPr marL="3657600" algn="l" defTabSz="914400" rtl="0" eaLnBrk="1" latinLnBrk="0" hangingPunct="1">
+      <a:defRPr sz="1200" kern="1200">
+        <a:solidFill>
+          <a:schemeClr val="tx1"/>
+        </a:solidFill>
+        <a:latin typeface="+mn-lt"/>
+        <a:ea typeface="+mn-ea"/>
+        <a:cs typeface="+mn-cs"/>
+      </a:defRPr>
+    </a:lvl9pPr>
+  </p:notesStyle>
+</p:notesMaster>
+</file>
+
+<file path=ppt/notesSlides/notesSlide1.xml><?xml version="1.0" encoding="utf-8"?>
+<p:notes xmlns:a="http://schemas.openxmlformats.org/drawingml/2006/main" xmlns:r="http://schemas.openxmlformats.org/officeDocument/2006/relationships" xmlns:p="http://schemas.openxmlformats.org/presentationml/2006/main">
+  <p:cSld>
+    <p:spTree>
+      <p:nvGrpSpPr>
+        <p:cNvPr id="1" name=""/>
+        <p:cNvGrpSpPr/>
+        <p:nvPr/>
+      </p:nvGrpSpPr>
+      <p:grpSpPr>
+        <a:xfrm>
+          <a:off x="0" y="0"/>
+          <a:ext cx="0" cy="0"/>
+          <a:chOff x="0" y="0"/>
+          <a:chExt cx="0" cy="0"/>
+        </a:xfrm>
+      </p:grpSpPr>
+      <p:sp>
+        <p:nvSpPr>
+          <p:cNvPr id="2" name="Folienbildplatzhalter 1"/>
+          <p:cNvSpPr>
+            <a:spLocks noGrp="1" noRot="1" noChangeAspect="1"/>
+          </p:cNvSpPr>
+          <p:nvPr>
+            <p:ph type="sldImg"/>
+          </p:nvPr>
+        </p:nvSpPr>
+        <p:spPr/>
+      </p:sp>
+      <p:sp>
+        <p:nvSpPr>
+          <p:cNvPr id="3" name="Notizenplatzhalter 2"/>
+          <p:cNvSpPr>
+            <a:spLocks noGrp="1"/>
+          </p:cNvSpPr>
+          <p:nvPr>
+            <p:ph type="body" idx="1"/>
+          </p:nvPr>
+        </p:nvSpPr>
+        <p:spPr/>
+        <p:txBody>
+          <a:bodyPr/>
+          <a:lstStyle/>
+          <a:p>
+            <a:r>
+              <a:rPr lang="de-AT" dirty="0" smtClean="0"/>
+              <a:t>Pre-shared Key: </a:t>
+            </a:r>
+          </a:p>
+          <a:p>
+            <a:r>
+              <a:rPr lang="de-AT" dirty="0" smtClean="0"/>
+              <a:t>•Statischer Schlüssel, dient zum </a:t>
+            </a:r>
+            <a:r>
+              <a:rPr lang="de-AT" dirty="0" err="1" smtClean="0"/>
+              <a:t>ver</a:t>
+            </a:r>
+            <a:r>
+              <a:rPr lang="de-AT" dirty="0" smtClean="0"/>
+              <a:t>- und entschlüsseln</a:t>
+            </a:r>
+          </a:p>
+          <a:p>
+            <a:r>
+              <a:rPr lang="de-AT" dirty="0" smtClean="0"/>
+              <a:t>•Darf nicht verloren gehen oder kompromittiert werden</a:t>
+            </a:r>
+          </a:p>
+          <a:p>
+            <a:r>
+              <a:rPr lang="de-AT" dirty="0" smtClean="0"/>
+              <a:t>Benutzer/Passwort: </a:t>
+            </a:r>
+          </a:p>
+          <a:p>
+            <a:r>
+              <a:rPr lang="de-AT" dirty="0" smtClean="0"/>
+              <a:t>•Statischer Key ist einem User zugewiesen</a:t>
+            </a:r>
+          </a:p>
+          <a:p>
+            <a:r>
+              <a:rPr lang="de-AT" dirty="0" smtClean="0"/>
+              <a:t>•anfällig für Man-In-The-Middle-Attacken </a:t>
+            </a:r>
+          </a:p>
+          <a:p>
+            <a:r>
+              <a:rPr lang="de-AT" dirty="0" smtClean="0"/>
+              <a:t>Zertifikatsbasiert: </a:t>
+            </a:r>
+          </a:p>
+          <a:p>
+            <a:r>
+              <a:rPr lang="de-AT" dirty="0" smtClean="0"/>
+              <a:t>•Authentifizierung über das TLS-Protokoll mit privaten und öffentlichen Schlüsselpaaren</a:t>
+            </a:r>
+          </a:p>
+          <a:p>
+            <a:r>
+              <a:rPr lang="de-AT" dirty="0" smtClean="0"/>
+              <a:t>•Server und Clients müssen ein gültiges, von einer bekannten Zertifizierungsstelle ausgestelltes Zertifikat besitzen.</a:t>
+            </a:r>
+          </a:p>
+          <a:p>
+            <a:endParaRPr lang="de-AT" dirty="0"/>
+          </a:p>
+        </p:txBody>
+      </p:sp>
+      <p:sp>
+        <p:nvSpPr>
+          <p:cNvPr id="4" name="Foliennummernplatzhalter 3"/>
+          <p:cNvSpPr>
+            <a:spLocks noGrp="1"/>
+          </p:cNvSpPr>
+          <p:nvPr>
+            <p:ph type="sldNum" sz="quarter" idx="10"/>
+          </p:nvPr>
+        </p:nvSpPr>
+        <p:spPr/>
+        <p:txBody>
+          <a:bodyPr/>
+          <a:lstStyle/>
+          <a:p>
+            <a:fld id="{40443D88-C795-4A05-8385-807CDE274C8A}" type="slidenum">
+              <a:rPr lang="de-AT" smtClean="0"/>
+              <a:t>15</a:t>
+            </a:fld>
+            <a:endParaRPr lang="de-AT"/>
+          </a:p>
+        </p:txBody>
+      </p:sp>
+    </p:spTree>
+    <p:extLst>
+      <p:ext uri="{BB962C8B-B14F-4D97-AF65-F5344CB8AC3E}">
+        <p14:creationId xmlns:p14="http://schemas.microsoft.com/office/powerpoint/2010/main" val="3677005363"/>
+      </p:ext>
+    </p:extLst>
+  </p:cSld>
+  <p:clrMapOvr>
+    <a:masterClrMapping/>
+  </p:clrMapOvr>
+</p:notes>
 </file>
 
 <file path=ppt/slideLayouts/slideLayout1.xml><?xml version="1.0" encoding="utf-8"?>
@@ -5820,6 +6333,762 @@
 </p:sld>
 </file>
 
+<file path=ppt/slides/slide10.xml><?xml version="1.0" encoding="utf-8"?>
+<p:sld xmlns:a="http://schemas.openxmlformats.org/drawingml/2006/main" xmlns:r="http://schemas.openxmlformats.org/officeDocument/2006/relationships" xmlns:p="http://schemas.openxmlformats.org/presentationml/2006/main">
+  <p:cSld>
+    <p:spTree>
+      <p:nvGrpSpPr>
+        <p:cNvPr id="1" name=""/>
+        <p:cNvGrpSpPr/>
+        <p:nvPr/>
+      </p:nvGrpSpPr>
+      <p:grpSpPr>
+        <a:xfrm>
+          <a:off x="0" y="0"/>
+          <a:ext cx="0" cy="0"/>
+          <a:chOff x="0" y="0"/>
+          <a:chExt cx="0" cy="0"/>
+        </a:xfrm>
+      </p:grpSpPr>
+      <p:sp>
+        <p:nvSpPr>
+          <p:cNvPr id="2" name="Titel 1"/>
+          <p:cNvSpPr>
+            <a:spLocks noGrp="1"/>
+          </p:cNvSpPr>
+          <p:nvPr>
+            <p:ph type="title"/>
+          </p:nvPr>
+        </p:nvSpPr>
+        <p:spPr/>
+        <p:txBody>
+          <a:bodyPr/>
+          <a:lstStyle/>
+          <a:p>
+            <a:r>
+              <a:rPr lang="de-AT" dirty="0" err="1" smtClean="0"/>
+              <a:t>Anwendunsszenarien</a:t>
+            </a:r>
+            <a:endParaRPr lang="de-AT" dirty="0"/>
+          </a:p>
+        </p:txBody>
+      </p:sp>
+      <p:sp>
+        <p:nvSpPr>
+          <p:cNvPr id="3" name="Inhaltsplatzhalter 2"/>
+          <p:cNvSpPr>
+            <a:spLocks noGrp="1"/>
+          </p:cNvSpPr>
+          <p:nvPr>
+            <p:ph idx="1"/>
+          </p:nvPr>
+        </p:nvSpPr>
+        <p:spPr/>
+        <p:txBody>
+          <a:bodyPr/>
+          <a:lstStyle/>
+          <a:p>
+            <a:r>
+              <a:rPr lang="de-AT" dirty="0" smtClean="0"/>
+              <a:t>Netzwerkzugriff für Außendienstmitarbeiter (Client-to-LAN)</a:t>
+            </a:r>
+          </a:p>
+          <a:p>
+            <a:r>
+              <a:rPr lang="de-AT" dirty="0" smtClean="0"/>
+              <a:t>Verbindung mehrerer Unternehmensstandorte (LAN-to-LAN)</a:t>
+            </a:r>
+          </a:p>
+          <a:p>
+            <a:r>
+              <a:rPr lang="de-AT" dirty="0" smtClean="0"/>
+              <a:t>Umgehung von Zensur</a:t>
+            </a:r>
+          </a:p>
+          <a:p>
+            <a:pPr lvl="1"/>
+            <a:r>
+              <a:rPr lang="de-AT" dirty="0" smtClean="0"/>
+              <a:t>Bspw. bei Standort in China od. Nordkorea</a:t>
+            </a:r>
+          </a:p>
+          <a:p>
+            <a:r>
+              <a:rPr lang="de-AT" dirty="0" smtClean="0"/>
+              <a:t>LAN-Spiele über Internet</a:t>
+            </a:r>
+            <a:endParaRPr lang="de-AT" dirty="0"/>
+          </a:p>
+        </p:txBody>
+      </p:sp>
+    </p:spTree>
+    <p:extLst>
+      <p:ext uri="{BB962C8B-B14F-4D97-AF65-F5344CB8AC3E}">
+        <p14:creationId xmlns:p14="http://schemas.microsoft.com/office/powerpoint/2010/main" val="3939505784"/>
+      </p:ext>
+    </p:extLst>
+  </p:cSld>
+  <p:clrMapOvr>
+    <a:masterClrMapping/>
+  </p:clrMapOvr>
+</p:sld>
+</file>
+
+<file path=ppt/slides/slide11.xml><?xml version="1.0" encoding="utf-8"?>
+<p:sld xmlns:a="http://schemas.openxmlformats.org/drawingml/2006/main" xmlns:r="http://schemas.openxmlformats.org/officeDocument/2006/relationships" xmlns:p="http://schemas.openxmlformats.org/presentationml/2006/main">
+  <p:cSld>
+    <p:spTree>
+      <p:nvGrpSpPr>
+        <p:cNvPr id="1" name=""/>
+        <p:cNvGrpSpPr/>
+        <p:nvPr/>
+      </p:nvGrpSpPr>
+      <p:grpSpPr>
+        <a:xfrm>
+          <a:off x="0" y="0"/>
+          <a:ext cx="0" cy="0"/>
+          <a:chOff x="0" y="0"/>
+          <a:chExt cx="0" cy="0"/>
+        </a:xfrm>
+      </p:grpSpPr>
+      <p:sp>
+        <p:nvSpPr>
+          <p:cNvPr id="2" name="Titel 1"/>
+          <p:cNvSpPr>
+            <a:spLocks noGrp="1"/>
+          </p:cNvSpPr>
+          <p:nvPr>
+            <p:ph type="title"/>
+          </p:nvPr>
+        </p:nvSpPr>
+        <p:spPr/>
+        <p:txBody>
+          <a:bodyPr/>
+          <a:lstStyle/>
+          <a:p>
+            <a:r>
+              <a:rPr lang="de-AT" dirty="0" smtClean="0"/>
+              <a:t>Verbindungsaufbau</a:t>
+            </a:r>
+            <a:endParaRPr lang="de-AT" dirty="0"/>
+          </a:p>
+        </p:txBody>
+      </p:sp>
+      <p:sp>
+        <p:nvSpPr>
+          <p:cNvPr id="3" name="Inhaltsplatzhalter 2"/>
+          <p:cNvSpPr>
+            <a:spLocks noGrp="1"/>
+          </p:cNvSpPr>
+          <p:nvPr>
+            <p:ph idx="1"/>
+          </p:nvPr>
+        </p:nvSpPr>
+        <p:spPr/>
+        <p:txBody>
+          <a:bodyPr/>
+          <a:lstStyle/>
+          <a:p>
+            <a:pPr marL="457200" lvl="0" indent="-457200">
+              <a:buFont typeface="+mj-lt"/>
+              <a:buAutoNum type="arabicPeriod"/>
+            </a:pPr>
+            <a:r>
+              <a:rPr lang="de-AT" dirty="0">
+                <a:effectLst/>
+              </a:rPr>
+              <a:t>Internetverbindung über normalen ISP wird hergestellt</a:t>
+            </a:r>
+          </a:p>
+          <a:p>
+            <a:pPr marL="457200" lvl="0" indent="-457200">
+              <a:buFont typeface="+mj-lt"/>
+              <a:buAutoNum type="arabicPeriod"/>
+            </a:pPr>
+            <a:r>
+              <a:rPr lang="de-AT" dirty="0">
+                <a:effectLst/>
+              </a:rPr>
+              <a:t>VPN-Client sendet Verbindungsanfrage an VPN-Server</a:t>
+            </a:r>
+          </a:p>
+          <a:p>
+            <a:pPr marL="457200" lvl="0" indent="-457200">
+              <a:buFont typeface="+mj-lt"/>
+              <a:buAutoNum type="arabicPeriod"/>
+            </a:pPr>
+            <a:r>
+              <a:rPr lang="de-AT" dirty="0" smtClean="0">
+                <a:effectLst/>
+              </a:rPr>
+              <a:t>Authentisierung </a:t>
+            </a:r>
+            <a:r>
+              <a:rPr lang="de-AT" dirty="0">
+                <a:effectLst/>
+              </a:rPr>
+              <a:t>beim VPN-Server</a:t>
+            </a:r>
+          </a:p>
+          <a:p>
+            <a:pPr marL="457200" lvl="0" indent="-457200">
+              <a:buFont typeface="+mj-lt"/>
+              <a:buAutoNum type="arabicPeriod"/>
+            </a:pPr>
+            <a:r>
+              <a:rPr lang="de-AT" dirty="0" err="1">
+                <a:effectLst/>
+              </a:rPr>
+              <a:t>IPsec</a:t>
+            </a:r>
+            <a:r>
+              <a:rPr lang="de-AT" dirty="0">
+                <a:effectLst/>
+              </a:rPr>
+              <a:t>-Tunnel (sicherer VPN-Datentunnel) wird </a:t>
+            </a:r>
+            <a:r>
+              <a:rPr lang="de-AT" dirty="0" smtClean="0">
+                <a:effectLst/>
+              </a:rPr>
+              <a:t>geöffnet</a:t>
+            </a:r>
+            <a:endParaRPr lang="de-AT" dirty="0">
+              <a:effectLst/>
+            </a:endParaRPr>
+          </a:p>
+        </p:txBody>
+      </p:sp>
+    </p:spTree>
+    <p:extLst>
+      <p:ext uri="{BB962C8B-B14F-4D97-AF65-F5344CB8AC3E}">
+        <p14:creationId xmlns:p14="http://schemas.microsoft.com/office/powerpoint/2010/main" val="236491627"/>
+      </p:ext>
+    </p:extLst>
+  </p:cSld>
+  <p:clrMapOvr>
+    <a:masterClrMapping/>
+  </p:clrMapOvr>
+</p:sld>
+</file>
+
+<file path=ppt/slides/slide12.xml><?xml version="1.0" encoding="utf-8"?>
+<p:sld xmlns:a="http://schemas.openxmlformats.org/drawingml/2006/main" xmlns:r="http://schemas.openxmlformats.org/officeDocument/2006/relationships" xmlns:p="http://schemas.openxmlformats.org/presentationml/2006/main">
+  <p:cSld>
+    <p:spTree>
+      <p:nvGrpSpPr>
+        <p:cNvPr id="1" name=""/>
+        <p:cNvGrpSpPr/>
+        <p:nvPr/>
+      </p:nvGrpSpPr>
+      <p:grpSpPr>
+        <a:xfrm>
+          <a:off x="0" y="0"/>
+          <a:ext cx="0" cy="0"/>
+          <a:chOff x="0" y="0"/>
+          <a:chExt cx="0" cy="0"/>
+        </a:xfrm>
+      </p:grpSpPr>
+      <p:sp>
+        <p:nvSpPr>
+          <p:cNvPr id="3" name="Inhaltsplatzhalter 2"/>
+          <p:cNvSpPr>
+            <a:spLocks noGrp="1"/>
+          </p:cNvSpPr>
+          <p:nvPr>
+            <p:ph idx="1"/>
+          </p:nvPr>
+        </p:nvSpPr>
+        <p:spPr>
+          <a:xfrm>
+            <a:off x="1072833" y="1341119"/>
+            <a:ext cx="9905998" cy="4442461"/>
+          </a:xfrm>
+        </p:spPr>
+        <p:txBody>
+          <a:bodyPr/>
+          <a:lstStyle/>
+          <a:p>
+            <a:r>
+              <a:rPr lang="de-AT" dirty="0" smtClean="0"/>
+              <a:t>Sobald Verbindung hergestellt, keine direkte Internetverbindung mehr</a:t>
+            </a:r>
+          </a:p>
+          <a:p>
+            <a:pPr lvl="1"/>
+            <a:r>
+              <a:rPr lang="de-AT" dirty="0" smtClean="0"/>
+              <a:t>Sonst sog. SPLIT-Tunnel (Sicherheitsrisiko)</a:t>
+            </a:r>
+          </a:p>
+          <a:p>
+            <a:r>
+              <a:rPr lang="de-AT" dirty="0" smtClean="0"/>
+              <a:t>Client bekommt private IP-Adresse aus verbundenem Netzwerk zugeteilt</a:t>
+            </a:r>
+          </a:p>
+          <a:p>
+            <a:pPr lvl="1"/>
+            <a:r>
+              <a:rPr lang="de-AT" dirty="0" smtClean="0"/>
+              <a:t>Ermöglicht Sicherung des firmenseitigen Endes mit Firewall</a:t>
+            </a:r>
+          </a:p>
+          <a:p>
+            <a:r>
+              <a:rPr lang="de-AT" dirty="0" smtClean="0"/>
+              <a:t>Jetzt kann sich der Client von (fast) jedem Verbindungsmedium (auch Satellit) mit Firmennetzwerk verbinden</a:t>
+            </a:r>
+            <a:endParaRPr lang="de-AT" dirty="0"/>
+          </a:p>
+        </p:txBody>
+      </p:sp>
+    </p:spTree>
+    <p:extLst>
+      <p:ext uri="{BB962C8B-B14F-4D97-AF65-F5344CB8AC3E}">
+        <p14:creationId xmlns:p14="http://schemas.microsoft.com/office/powerpoint/2010/main" val="2400687259"/>
+      </p:ext>
+    </p:extLst>
+  </p:cSld>
+  <p:clrMapOvr>
+    <a:masterClrMapping/>
+  </p:clrMapOvr>
+  <p:timing>
+    <p:tnLst>
+      <p:par>
+        <p:cTn id="1" dur="indefinite" restart="never" nodeType="tmRoot"/>
+      </p:par>
+    </p:tnLst>
+  </p:timing>
+</p:sld>
+</file>
+
+<file path=ppt/slides/slide13.xml><?xml version="1.0" encoding="utf-8"?>
+<p:sld xmlns:a="http://schemas.openxmlformats.org/drawingml/2006/main" xmlns:r="http://schemas.openxmlformats.org/officeDocument/2006/relationships" xmlns:p="http://schemas.openxmlformats.org/presentationml/2006/main">
+  <p:cSld>
+    <p:spTree>
+      <p:nvGrpSpPr>
+        <p:cNvPr id="1" name=""/>
+        <p:cNvGrpSpPr/>
+        <p:nvPr/>
+      </p:nvGrpSpPr>
+      <p:grpSpPr>
+        <a:xfrm>
+          <a:off x="0" y="0"/>
+          <a:ext cx="0" cy="0"/>
+          <a:chOff x="0" y="0"/>
+          <a:chExt cx="0" cy="0"/>
+        </a:xfrm>
+      </p:grpSpPr>
+      <p:sp>
+        <p:nvSpPr>
+          <p:cNvPr id="2" name="Titel 1"/>
+          <p:cNvSpPr>
+            <a:spLocks noGrp="1"/>
+          </p:cNvSpPr>
+          <p:nvPr>
+            <p:ph type="title"/>
+          </p:nvPr>
+        </p:nvSpPr>
+        <p:spPr/>
+        <p:txBody>
+          <a:bodyPr/>
+          <a:lstStyle/>
+          <a:p>
+            <a:r>
+              <a:rPr lang="de-AT" dirty="0" err="1" smtClean="0"/>
+              <a:t>Netztopologien</a:t>
+            </a:r>
+            <a:endParaRPr lang="de-AT" dirty="0"/>
+          </a:p>
+        </p:txBody>
+      </p:sp>
+      <p:sp>
+        <p:nvSpPr>
+          <p:cNvPr id="3" name="Inhaltsplatzhalter 2"/>
+          <p:cNvSpPr>
+            <a:spLocks noGrp="1"/>
+          </p:cNvSpPr>
+          <p:nvPr>
+            <p:ph idx="1"/>
+          </p:nvPr>
+        </p:nvSpPr>
+        <p:spPr>
+          <a:xfrm>
+            <a:off x="1141413" y="1897380"/>
+            <a:ext cx="9905998" cy="4206239"/>
+          </a:xfrm>
+        </p:spPr>
+        <p:txBody>
+          <a:bodyPr>
+            <a:normAutofit/>
+          </a:bodyPr>
+          <a:lstStyle/>
+          <a:p>
+            <a:r>
+              <a:rPr lang="de-AT" dirty="0" smtClean="0"/>
+              <a:t>Point to Point</a:t>
+            </a:r>
+          </a:p>
+          <a:p>
+            <a:pPr lvl="1"/>
+            <a:r>
+              <a:rPr lang="de-AT" dirty="0" smtClean="0"/>
+              <a:t>Direkte Verbindung zweier Netzwerkknoten</a:t>
+            </a:r>
+          </a:p>
+          <a:p>
+            <a:pPr lvl="2"/>
+            <a:r>
+              <a:rPr lang="de-AT" dirty="0" smtClean="0"/>
+              <a:t>Client Server oder durch Routing Netzwerke anbinden</a:t>
+            </a:r>
+          </a:p>
+          <a:p>
+            <a:pPr lvl="1"/>
+            <a:r>
+              <a:rPr lang="de-AT" dirty="0" smtClean="0"/>
+              <a:t>TUN-Schnittstelle </a:t>
+            </a:r>
+          </a:p>
+          <a:p>
+            <a:pPr lvl="2"/>
+            <a:r>
+              <a:rPr lang="de-AT" dirty="0" smtClean="0"/>
+              <a:t>Virtuelle Netzwerkkarte auf OSI-3 (IP)</a:t>
+            </a:r>
+          </a:p>
+          <a:p>
+            <a:r>
+              <a:rPr lang="de-AT" dirty="0" smtClean="0"/>
+              <a:t>Ethernet</a:t>
+            </a:r>
+          </a:p>
+          <a:p>
+            <a:pPr lvl="1"/>
+            <a:r>
+              <a:rPr lang="de-AT" dirty="0" smtClean="0"/>
+              <a:t>TAP-Schnittstelle</a:t>
+            </a:r>
+          </a:p>
+          <a:p>
+            <a:pPr lvl="2"/>
+            <a:r>
+              <a:rPr lang="de-AT" dirty="0" smtClean="0"/>
+              <a:t>Virtuelle Netzwerkkarte auf OSI-2</a:t>
+            </a:r>
+          </a:p>
+          <a:p>
+            <a:pPr lvl="1"/>
+            <a:r>
+              <a:rPr lang="de-AT" dirty="0" smtClean="0"/>
+              <a:t>Erlaubt Client direkte Verbindung mit Netzwerk</a:t>
+            </a:r>
+          </a:p>
+          <a:p>
+            <a:pPr lvl="2"/>
+            <a:r>
+              <a:rPr lang="de-AT" dirty="0" smtClean="0"/>
+              <a:t>VPN-Server als Switch</a:t>
+            </a:r>
+            <a:endParaRPr lang="de-AT" dirty="0"/>
+          </a:p>
+        </p:txBody>
+      </p:sp>
+    </p:spTree>
+    <p:extLst>
+      <p:ext uri="{BB962C8B-B14F-4D97-AF65-F5344CB8AC3E}">
+        <p14:creationId xmlns:p14="http://schemas.microsoft.com/office/powerpoint/2010/main" val="1688519374"/>
+      </p:ext>
+    </p:extLst>
+  </p:cSld>
+  <p:clrMapOvr>
+    <a:masterClrMapping/>
+  </p:clrMapOvr>
+  <p:timing>
+    <p:tnLst>
+      <p:par>
+        <p:cTn id="1" dur="indefinite" restart="never" nodeType="tmRoot"/>
+      </p:par>
+    </p:tnLst>
+  </p:timing>
+</p:sld>
+</file>
+
+<file path=ppt/slides/slide14.xml><?xml version="1.0" encoding="utf-8"?>
+<p:sld xmlns:a="http://schemas.openxmlformats.org/drawingml/2006/main" xmlns:r="http://schemas.openxmlformats.org/officeDocument/2006/relationships" xmlns:p="http://schemas.openxmlformats.org/presentationml/2006/main">
+  <p:cSld>
+    <p:spTree>
+      <p:nvGrpSpPr>
+        <p:cNvPr id="1" name=""/>
+        <p:cNvGrpSpPr/>
+        <p:nvPr/>
+      </p:nvGrpSpPr>
+      <p:grpSpPr>
+        <a:xfrm>
+          <a:off x="0" y="0"/>
+          <a:ext cx="0" cy="0"/>
+          <a:chOff x="0" y="0"/>
+          <a:chExt cx="0" cy="0"/>
+        </a:xfrm>
+      </p:grpSpPr>
+      <p:sp>
+        <p:nvSpPr>
+          <p:cNvPr id="2" name="Titel 1"/>
+          <p:cNvSpPr>
+            <a:spLocks noGrp="1"/>
+          </p:cNvSpPr>
+          <p:nvPr>
+            <p:ph type="title"/>
+          </p:nvPr>
+        </p:nvSpPr>
+        <p:spPr>
+          <a:xfrm>
+            <a:off x="1141413" y="198120"/>
+            <a:ext cx="9905998" cy="1905000"/>
+          </a:xfrm>
+        </p:spPr>
+        <p:txBody>
+          <a:bodyPr/>
+          <a:lstStyle/>
+          <a:p>
+            <a:r>
+              <a:rPr lang="de-AT" dirty="0" smtClean="0"/>
+              <a:t>Netzwerkanbindung</a:t>
+            </a:r>
+            <a:endParaRPr lang="de-AT" dirty="0"/>
+          </a:p>
+        </p:txBody>
+      </p:sp>
+      <p:sp>
+        <p:nvSpPr>
+          <p:cNvPr id="3" name="Inhaltsplatzhalter 2"/>
+          <p:cNvSpPr>
+            <a:spLocks noGrp="1"/>
+          </p:cNvSpPr>
+          <p:nvPr>
+            <p:ph idx="1"/>
+          </p:nvPr>
+        </p:nvSpPr>
+        <p:spPr>
+          <a:xfrm>
+            <a:off x="1141413" y="1783080"/>
+            <a:ext cx="9905998" cy="4709160"/>
+          </a:xfrm>
+        </p:spPr>
+        <p:txBody>
+          <a:bodyPr>
+            <a:normAutofit/>
+          </a:bodyPr>
+          <a:lstStyle/>
+          <a:p>
+            <a:r>
+              <a:rPr lang="de-AT" dirty="0" smtClean="0"/>
+              <a:t>Routing:</a:t>
+            </a:r>
+          </a:p>
+          <a:p>
+            <a:pPr lvl="1"/>
+            <a:r>
+              <a:rPr lang="de-AT" dirty="0" smtClean="0"/>
+              <a:t>VPN-Knoten arbeiten auf IP-Ebene</a:t>
+            </a:r>
+          </a:p>
+          <a:p>
+            <a:pPr lvl="1"/>
+            <a:r>
+              <a:rPr lang="de-AT" dirty="0" smtClean="0"/>
+              <a:t>Ermöglicht Verbindung von Privaten Netzen</a:t>
+            </a:r>
+          </a:p>
+          <a:p>
+            <a:pPr lvl="1"/>
+            <a:r>
+              <a:rPr lang="de-AT" dirty="0" smtClean="0"/>
+              <a:t>Wird durch eigenständiges Netz dargestellt</a:t>
+            </a:r>
+          </a:p>
+          <a:p>
+            <a:pPr lvl="1"/>
+            <a:r>
+              <a:rPr lang="de-AT" dirty="0" smtClean="0"/>
+              <a:t>Broadcasts nicht ohne Weiteres möglich</a:t>
+            </a:r>
+          </a:p>
+          <a:p>
+            <a:r>
+              <a:rPr lang="de-AT" dirty="0" smtClean="0"/>
+              <a:t>Bridging:</a:t>
+            </a:r>
+          </a:p>
+          <a:p>
+            <a:pPr lvl="1"/>
+            <a:r>
+              <a:rPr lang="de-AT" dirty="0" smtClean="0"/>
+              <a:t>Betriebssystem verbindet reale Netzwerkkarte mit Virtueller TAP-Schnittstelle</a:t>
+            </a:r>
+          </a:p>
+          <a:p>
+            <a:pPr lvl="1"/>
+            <a:r>
+              <a:rPr lang="de-AT" dirty="0" smtClean="0"/>
+              <a:t>Switch auf Layer-2</a:t>
+            </a:r>
+          </a:p>
+          <a:p>
+            <a:pPr lvl="1"/>
+            <a:r>
+              <a:rPr lang="de-AT" dirty="0" smtClean="0"/>
+              <a:t>Broadcasts möglich – Verhalten wie im selben Netzwerk</a:t>
+            </a:r>
+          </a:p>
+          <a:p>
+            <a:pPr lvl="2"/>
+            <a:r>
+              <a:rPr lang="de-AT" dirty="0" smtClean="0"/>
+              <a:t>Broadcasts nehmen viel Bandbreite in Anspruch</a:t>
+            </a:r>
+          </a:p>
+          <a:p>
+            <a:pPr lvl="2"/>
+            <a:r>
+              <a:rPr lang="de-AT" dirty="0" smtClean="0"/>
+              <a:t>Achtung vor DHCP-Servern</a:t>
+            </a:r>
+          </a:p>
+          <a:p>
+            <a:pPr lvl="1"/>
+            <a:endParaRPr lang="de-AT" dirty="0"/>
+          </a:p>
+        </p:txBody>
+      </p:sp>
+    </p:spTree>
+    <p:extLst>
+      <p:ext uri="{BB962C8B-B14F-4D97-AF65-F5344CB8AC3E}">
+        <p14:creationId xmlns:p14="http://schemas.microsoft.com/office/powerpoint/2010/main" val="286545527"/>
+      </p:ext>
+    </p:extLst>
+  </p:cSld>
+  <p:clrMapOvr>
+    <a:masterClrMapping/>
+  </p:clrMapOvr>
+</p:sld>
+</file>
+
+<file path=ppt/slides/slide15.xml><?xml version="1.0" encoding="utf-8"?>
+<p:sld xmlns:a="http://schemas.openxmlformats.org/drawingml/2006/main" xmlns:r="http://schemas.openxmlformats.org/officeDocument/2006/relationships" xmlns:p="http://schemas.openxmlformats.org/presentationml/2006/main">
+  <p:cSld>
+    <p:spTree>
+      <p:nvGrpSpPr>
+        <p:cNvPr id="1" name=""/>
+        <p:cNvGrpSpPr/>
+        <p:nvPr/>
+      </p:nvGrpSpPr>
+      <p:grpSpPr>
+        <a:xfrm>
+          <a:off x="0" y="0"/>
+          <a:ext cx="0" cy="0"/>
+          <a:chOff x="0" y="0"/>
+          <a:chExt cx="0" cy="0"/>
+        </a:xfrm>
+      </p:grpSpPr>
+      <p:sp>
+        <p:nvSpPr>
+          <p:cNvPr id="2" name="Titel 1"/>
+          <p:cNvSpPr>
+            <a:spLocks noGrp="1"/>
+          </p:cNvSpPr>
+          <p:nvPr>
+            <p:ph type="title"/>
+          </p:nvPr>
+        </p:nvSpPr>
+        <p:spPr/>
+        <p:txBody>
+          <a:bodyPr/>
+          <a:lstStyle/>
+          <a:p>
+            <a:r>
+              <a:rPr lang="de-AT" dirty="0" smtClean="0"/>
+              <a:t>Open VPN</a:t>
+            </a:r>
+            <a:endParaRPr lang="de-AT" dirty="0"/>
+          </a:p>
+        </p:txBody>
+      </p:sp>
+      <p:sp>
+        <p:nvSpPr>
+          <p:cNvPr id="3" name="Inhaltsplatzhalter 2"/>
+          <p:cNvSpPr>
+            <a:spLocks noGrp="1"/>
+          </p:cNvSpPr>
+          <p:nvPr>
+            <p:ph idx="1"/>
+          </p:nvPr>
+        </p:nvSpPr>
+        <p:spPr>
+          <a:xfrm>
+            <a:off x="1141413" y="1805940"/>
+            <a:ext cx="9905998" cy="4457699"/>
+          </a:xfrm>
+        </p:spPr>
+        <p:txBody>
+          <a:bodyPr/>
+          <a:lstStyle/>
+          <a:p>
+            <a:r>
+              <a:rPr lang="de-AT" dirty="0" smtClean="0"/>
+              <a:t>Plattformunabhängig, Quelloffen</a:t>
+            </a:r>
+          </a:p>
+          <a:p>
+            <a:r>
+              <a:rPr lang="de-AT" dirty="0" smtClean="0"/>
+              <a:t>Meist genutzter VPN Service</a:t>
+            </a:r>
+          </a:p>
+          <a:p>
+            <a:r>
+              <a:rPr lang="de-AT" dirty="0" smtClean="0"/>
+              <a:t>3 Authentifizierungsmöglichkeiten:</a:t>
+            </a:r>
+          </a:p>
+          <a:p>
+            <a:pPr lvl="1"/>
+            <a:r>
+              <a:rPr lang="de-AT" dirty="0" smtClean="0"/>
+              <a:t>Pre-Shared Key</a:t>
+            </a:r>
+          </a:p>
+          <a:p>
+            <a:pPr lvl="1"/>
+            <a:r>
+              <a:rPr lang="de-AT" dirty="0" smtClean="0"/>
+              <a:t>Benutzer/Passwort</a:t>
+            </a:r>
+          </a:p>
+          <a:p>
+            <a:pPr lvl="1"/>
+            <a:r>
+              <a:rPr lang="de-AT" dirty="0" smtClean="0"/>
+              <a:t>Zertifikatsbasiert</a:t>
+            </a:r>
+            <a:endParaRPr lang="de-AT" dirty="0"/>
+          </a:p>
+        </p:txBody>
+      </p:sp>
+    </p:spTree>
+    <p:extLst>
+      <p:ext uri="{BB962C8B-B14F-4D97-AF65-F5344CB8AC3E}">
+        <p14:creationId xmlns:p14="http://schemas.microsoft.com/office/powerpoint/2010/main" val="3825790451"/>
+      </p:ext>
+    </p:extLst>
+  </p:cSld>
+  <p:clrMapOvr>
+    <a:masterClrMapping/>
+  </p:clrMapOvr>
+</p:sld>
+</file>
+
 <file path=ppt/slides/slide2.xml><?xml version="1.0" encoding="utf-8"?>
 <p:sld xmlns:a="http://schemas.openxmlformats.org/drawingml/2006/main" xmlns:r="http://schemas.openxmlformats.org/officeDocument/2006/relationships" xmlns:p="http://schemas.openxmlformats.org/presentationml/2006/main">
   <p:cSld>
@@ -6455,8 +7724,12 @@
               <a:p>
                 <a:pPr lvl="1"/>
                 <a:r>
-                  <a:rPr lang="de-AT" smtClean="0"/>
+                  <a:rPr lang="de-AT" dirty="0" smtClean="0"/>
                   <a:t>G = </a:t>
+                </a:r>
+                <a:r>
+                  <a:rPr lang="de-AT" dirty="0" smtClean="0"/>
+                  <a:t>Geheimtext, Rest der Ganzzahlendivision</a:t>
                 </a:r>
                 <a:endParaRPr lang="de-AT" dirty="0"/>
               </a:p>
@@ -6501,6 +7774,365 @@
     <p:extLst>
       <p:ext uri="{BB962C8B-B14F-4D97-AF65-F5344CB8AC3E}">
         <p14:creationId xmlns:p14="http://schemas.microsoft.com/office/powerpoint/2010/main" val="3958280545"/>
+      </p:ext>
+    </p:extLst>
+  </p:cSld>
+  <p:clrMapOvr>
+    <a:masterClrMapping/>
+  </p:clrMapOvr>
+</p:sld>
+</file>
+
+<file path=ppt/slides/slide7.xml><?xml version="1.0" encoding="utf-8"?>
+<p:sld xmlns:a="http://schemas.openxmlformats.org/drawingml/2006/main" xmlns:r="http://schemas.openxmlformats.org/officeDocument/2006/relationships" xmlns:p="http://schemas.openxmlformats.org/presentationml/2006/main">
+  <p:cSld>
+    <p:spTree>
+      <p:nvGrpSpPr>
+        <p:cNvPr id="1" name=""/>
+        <p:cNvGrpSpPr/>
+        <p:nvPr/>
+      </p:nvGrpSpPr>
+      <p:grpSpPr>
+        <a:xfrm>
+          <a:off x="0" y="0"/>
+          <a:ext cx="0" cy="0"/>
+          <a:chOff x="0" y="0"/>
+          <a:chExt cx="0" cy="0"/>
+        </a:xfrm>
+      </p:grpSpPr>
+      <p:sp>
+        <p:nvSpPr>
+          <p:cNvPr id="2" name="Titel 1"/>
+          <p:cNvSpPr>
+            <a:spLocks noGrp="1"/>
+          </p:cNvSpPr>
+          <p:nvPr>
+            <p:ph type="title"/>
+          </p:nvPr>
+        </p:nvSpPr>
+        <p:spPr/>
+        <p:txBody>
+          <a:bodyPr/>
+          <a:lstStyle/>
+          <a:p>
+            <a:r>
+              <a:rPr lang="de-AT" dirty="0" smtClean="0"/>
+              <a:t>Entschlüsselung</a:t>
+            </a:r>
+            <a:endParaRPr lang="de-AT" dirty="0"/>
+          </a:p>
+        </p:txBody>
+      </p:sp>
+      <mc:AlternateContent xmlns:mc="http://schemas.openxmlformats.org/markup-compatibility/2006">
+        <mc:Choice xmlns:a14="http://schemas.microsoft.com/office/drawing/2010/main" Requires="a14">
+          <p:sp>
+            <p:nvSpPr>
+              <p:cNvPr id="3" name="Inhaltsplatzhalter 2"/>
+              <p:cNvSpPr>
+                <a:spLocks noGrp="1"/>
+              </p:cNvSpPr>
+              <p:nvPr>
+                <p:ph idx="1"/>
+              </p:nvPr>
+            </p:nvSpPr>
+            <p:spPr/>
+            <p:txBody>
+              <a:bodyPr/>
+              <a:lstStyle/>
+              <a:p>
+                <a:r>
+                  <a:rPr lang="de-AT" dirty="0" smtClean="0"/>
+                  <a:t>Entschlüsselung ist die Umkehrung der Verschlüsselung</a:t>
+                </a:r>
+              </a:p>
+              <a:p>
+                <a14:m>
+                  <m:oMath xmlns:m="http://schemas.openxmlformats.org/officeDocument/2006/math">
+                    <m:r>
+                      <a:rPr lang="de-AT" b="0" i="1" smtClean="0">
+                        <a:latin typeface="Cambria Math" panose="02040503050406030204" pitchFamily="18" charset="0"/>
+                      </a:rPr>
+                      <m:t>𝑡</m:t>
+                    </m:r>
+                    <m:r>
+                      <a:rPr lang="de-AT" b="0" i="1" smtClean="0">
+                        <a:latin typeface="Cambria Math" panose="02040503050406030204" pitchFamily="18" charset="0"/>
+                      </a:rPr>
+                      <m:t>=</m:t>
+                    </m:r>
+                    <m:sSup>
+                      <m:sSupPr>
+                        <m:ctrlPr>
+                          <a:rPr lang="de-AT" b="0" i="1" smtClean="0">
+                            <a:latin typeface="Cambria Math" panose="02040503050406030204" pitchFamily="18" charset="0"/>
+                          </a:rPr>
+                        </m:ctrlPr>
+                      </m:sSupPr>
+                      <m:e>
+                        <m:r>
+                          <a:rPr lang="de-AT" b="0" i="1" smtClean="0">
+                            <a:latin typeface="Cambria Math" panose="02040503050406030204" pitchFamily="18" charset="0"/>
+                          </a:rPr>
+                          <m:t>𝑔</m:t>
+                        </m:r>
+                      </m:e>
+                      <m:sup>
+                        <m:r>
+                          <a:rPr lang="de-AT" b="0" i="1" smtClean="0">
+                            <a:latin typeface="Cambria Math" panose="02040503050406030204" pitchFamily="18" charset="0"/>
+                          </a:rPr>
+                          <m:t>𝑑</m:t>
+                        </m:r>
+                      </m:sup>
+                    </m:sSup>
+                    <m:r>
+                      <a:rPr lang="de-AT" b="0" i="1" smtClean="0">
+                        <a:latin typeface="Cambria Math" panose="02040503050406030204" pitchFamily="18" charset="0"/>
+                      </a:rPr>
+                      <m:t> </m:t>
+                    </m:r>
+                    <m:r>
+                      <a:rPr lang="de-AT" b="0" i="1" smtClean="0">
+                        <a:latin typeface="Cambria Math" panose="02040503050406030204" pitchFamily="18" charset="0"/>
+                      </a:rPr>
+                      <m:t>𝑀𝑂𝐷</m:t>
+                    </m:r>
+                    <m:r>
+                      <a:rPr lang="de-AT" b="0" i="1" smtClean="0">
+                        <a:latin typeface="Cambria Math" panose="02040503050406030204" pitchFamily="18" charset="0"/>
+                      </a:rPr>
+                      <m:t> </m:t>
+                    </m:r>
+                    <m:r>
+                      <a:rPr lang="de-AT" b="0" i="1" smtClean="0">
+                        <a:latin typeface="Cambria Math" panose="02040503050406030204" pitchFamily="18" charset="0"/>
+                      </a:rPr>
+                      <m:t>𝑛</m:t>
+                    </m:r>
+                  </m:oMath>
+                </a14:m>
+                <a:endParaRPr lang="de-AT" dirty="0" smtClean="0"/>
+              </a:p>
+              <a:p>
+                <a:r>
+                  <a:rPr lang="de-AT" dirty="0" smtClean="0"/>
+                  <a:t>D entspricht privatem Schlüssel des Empfängers</a:t>
+                </a:r>
+                <a:endParaRPr lang="de-AT" dirty="0"/>
+              </a:p>
+            </p:txBody>
+          </p:sp>
+        </mc:Choice>
+        <mc:Fallback>
+          <p:sp>
+            <p:nvSpPr>
+              <p:cNvPr id="3" name="Inhaltsplatzhalter 2"/>
+              <p:cNvSpPr>
+                <a:spLocks noGrp="1" noRot="1" noChangeAspect="1" noMove="1" noResize="1" noEditPoints="1" noAdjustHandles="1" noChangeArrowheads="1" noChangeShapeType="1" noTextEdit="1"/>
+              </p:cNvSpPr>
+              <p:nvPr>
+                <p:ph idx="1"/>
+              </p:nvPr>
+            </p:nvSpPr>
+            <p:spPr>
+              <a:blipFill rotWithShape="0">
+                <a:blip r:embed="rId2"/>
+                <a:stretch>
+                  <a:fillRect l="-985"/>
+                </a:stretch>
+              </a:blipFill>
+            </p:spPr>
+            <p:txBody>
+              <a:bodyPr/>
+              <a:lstStyle/>
+              <a:p>
+                <a:r>
+                  <a:rPr lang="de-AT">
+                    <a:noFill/>
+                  </a:rPr>
+                  <a:t> </a:t>
+                </a:r>
+              </a:p>
+            </p:txBody>
+          </p:sp>
+        </mc:Fallback>
+      </mc:AlternateContent>
+    </p:spTree>
+    <p:extLst>
+      <p:ext uri="{BB962C8B-B14F-4D97-AF65-F5344CB8AC3E}">
+        <p14:creationId xmlns:p14="http://schemas.microsoft.com/office/powerpoint/2010/main" val="1045260776"/>
+      </p:ext>
+    </p:extLst>
+  </p:cSld>
+  <p:clrMapOvr>
+    <a:masterClrMapping/>
+  </p:clrMapOvr>
+</p:sld>
+</file>
+
+<file path=ppt/slides/slide8.xml><?xml version="1.0" encoding="utf-8"?>
+<p:sld xmlns:a="http://schemas.openxmlformats.org/drawingml/2006/main" xmlns:r="http://schemas.openxmlformats.org/officeDocument/2006/relationships" xmlns:p="http://schemas.openxmlformats.org/presentationml/2006/main">
+  <p:cSld>
+    <p:spTree>
+      <p:nvGrpSpPr>
+        <p:cNvPr id="1" name=""/>
+        <p:cNvGrpSpPr/>
+        <p:nvPr/>
+      </p:nvGrpSpPr>
+      <p:grpSpPr>
+        <a:xfrm>
+          <a:off x="0" y="0"/>
+          <a:ext cx="0" cy="0"/>
+          <a:chOff x="0" y="0"/>
+          <a:chExt cx="0" cy="0"/>
+        </a:xfrm>
+      </p:grpSpPr>
+      <p:sp>
+        <p:nvSpPr>
+          <p:cNvPr id="2" name="Titel 1"/>
+          <p:cNvSpPr>
+            <a:spLocks noGrp="1"/>
+          </p:cNvSpPr>
+          <p:nvPr>
+            <p:ph type="title"/>
+          </p:nvPr>
+        </p:nvSpPr>
+        <p:spPr/>
+        <p:txBody>
+          <a:bodyPr/>
+          <a:lstStyle/>
+          <a:p>
+            <a:r>
+              <a:rPr lang="de-AT" dirty="0" smtClean="0"/>
+              <a:t>SCHIPFI mit </a:t>
+            </a:r>
+            <a:r>
+              <a:rPr lang="de-AT" dirty="0" err="1" smtClean="0"/>
+              <a:t>dadenbangen</a:t>
+            </a:r>
+            <a:r>
+              <a:rPr lang="de-AT" dirty="0" smtClean="0"/>
+              <a:t> und </a:t>
+            </a:r>
+            <a:r>
+              <a:rPr lang="de-AT" dirty="0" err="1" smtClean="0"/>
+              <a:t>sql</a:t>
+            </a:r>
+            <a:endParaRPr lang="de-AT" dirty="0"/>
+          </a:p>
+        </p:txBody>
+      </p:sp>
+      <p:sp>
+        <p:nvSpPr>
+          <p:cNvPr id="3" name="Inhaltsplatzhalter 2"/>
+          <p:cNvSpPr>
+            <a:spLocks noGrp="1"/>
+          </p:cNvSpPr>
+          <p:nvPr>
+            <p:ph idx="1"/>
+          </p:nvPr>
+        </p:nvSpPr>
+        <p:spPr/>
+        <p:txBody>
+          <a:bodyPr/>
+          <a:lstStyle/>
+          <a:p>
+            <a:endParaRPr lang="de-AT"/>
+          </a:p>
+        </p:txBody>
+      </p:sp>
+    </p:spTree>
+    <p:extLst>
+      <p:ext uri="{BB962C8B-B14F-4D97-AF65-F5344CB8AC3E}">
+        <p14:creationId xmlns:p14="http://schemas.microsoft.com/office/powerpoint/2010/main" val="4064826252"/>
+      </p:ext>
+    </p:extLst>
+  </p:cSld>
+  <p:clrMapOvr>
+    <a:masterClrMapping/>
+  </p:clrMapOvr>
+</p:sld>
+</file>
+
+<file path=ppt/slides/slide9.xml><?xml version="1.0" encoding="utf-8"?>
+<p:sld xmlns:a="http://schemas.openxmlformats.org/drawingml/2006/main" xmlns:r="http://schemas.openxmlformats.org/officeDocument/2006/relationships" xmlns:p="http://schemas.openxmlformats.org/presentationml/2006/main">
+  <p:cSld>
+    <p:spTree>
+      <p:nvGrpSpPr>
+        <p:cNvPr id="1" name=""/>
+        <p:cNvGrpSpPr/>
+        <p:nvPr/>
+      </p:nvGrpSpPr>
+      <p:grpSpPr>
+        <a:xfrm>
+          <a:off x="0" y="0"/>
+          <a:ext cx="0" cy="0"/>
+          <a:chOff x="0" y="0"/>
+          <a:chExt cx="0" cy="0"/>
+        </a:xfrm>
+      </p:grpSpPr>
+      <p:sp>
+        <p:nvSpPr>
+          <p:cNvPr id="2" name="Titel 1"/>
+          <p:cNvSpPr>
+            <a:spLocks noGrp="1"/>
+          </p:cNvSpPr>
+          <p:nvPr>
+            <p:ph type="title"/>
+          </p:nvPr>
+        </p:nvSpPr>
+        <p:spPr/>
+        <p:txBody>
+          <a:bodyPr/>
+          <a:lstStyle/>
+          <a:p>
+            <a:r>
+              <a:rPr lang="de-AT" dirty="0" smtClean="0"/>
+              <a:t>Virtual Private Network</a:t>
+            </a:r>
+            <a:endParaRPr lang="de-AT" dirty="0"/>
+          </a:p>
+        </p:txBody>
+      </p:sp>
+      <p:sp>
+        <p:nvSpPr>
+          <p:cNvPr id="3" name="Inhaltsplatzhalter 2"/>
+          <p:cNvSpPr>
+            <a:spLocks noGrp="1"/>
+          </p:cNvSpPr>
+          <p:nvPr>
+            <p:ph idx="1"/>
+          </p:nvPr>
+        </p:nvSpPr>
+        <p:spPr/>
+        <p:txBody>
+          <a:bodyPr/>
+          <a:lstStyle/>
+          <a:p>
+            <a:r>
+              <a:rPr lang="de-AT" dirty="0" smtClean="0"/>
+              <a:t>Dient dazu, Teilnehmer eines privaten Netzwerks mit einem anderen Privaten Netzwerk zu verbinden (Bspw. Heimnetz Firmennetz)</a:t>
+            </a:r>
+          </a:p>
+          <a:p>
+            <a:r>
+              <a:rPr lang="de-AT" dirty="0" smtClean="0"/>
+              <a:t>Dadurch kann auf ein lokale Netzwerk zugegriffen werden, ohne anwesend sein zu müssen</a:t>
+            </a:r>
+          </a:p>
+          <a:p>
+            <a:r>
+              <a:rPr lang="de-AT" dirty="0" smtClean="0"/>
+              <a:t>VPN ist ein Softwareprodukt, welches eine Verschlüsselte Verbindung durch einen sog. Tunnel herstellt.</a:t>
+            </a:r>
+            <a:endParaRPr lang="de-AT" dirty="0"/>
+          </a:p>
+        </p:txBody>
+      </p:sp>
+    </p:spTree>
+    <p:extLst>
+      <p:ext uri="{BB962C8B-B14F-4D97-AF65-F5344CB8AC3E}">
+        <p14:creationId xmlns:p14="http://schemas.microsoft.com/office/powerpoint/2010/main" val="3261060894"/>
       </p:ext>
     </p:extLst>
   </p:cSld>
@@ -6764,4 +8396,265 @@
     </a:ext>
   </a:extLst>
 </a:theme>
+</file>
+
+<file path=ppt/theme/theme2.xml><?xml version="1.0" encoding="utf-8"?>
+<a:theme xmlns:a="http://schemas.openxmlformats.org/drawingml/2006/main" name="Office Theme">
+  <a:themeElements>
+    <a:clrScheme name="Office">
+      <a:dk1>
+        <a:sysClr val="windowText" lastClr="000000"/>
+      </a:dk1>
+      <a:lt1>
+        <a:sysClr val="window" lastClr="FFFFFF"/>
+      </a:lt1>
+      <a:dk2>
+        <a:srgbClr val="44546A"/>
+      </a:dk2>
+      <a:lt2>
+        <a:srgbClr val="E7E6E6"/>
+      </a:lt2>
+      <a:accent1>
+        <a:srgbClr val="5B9BD5"/>
+      </a:accent1>
+      <a:accent2>
+        <a:srgbClr val="ED7D31"/>
+      </a:accent2>
+      <a:accent3>
+        <a:srgbClr val="A5A5A5"/>
+      </a:accent3>
+      <a:accent4>
+        <a:srgbClr val="FFC000"/>
+      </a:accent4>
+      <a:accent5>
+        <a:srgbClr val="4472C4"/>
+      </a:accent5>
+      <a:accent6>
+        <a:srgbClr val="70AD47"/>
+      </a:accent6>
+      <a:hlink>
+        <a:srgbClr val="0563C1"/>
+      </a:hlink>
+      <a:folHlink>
+        <a:srgbClr val="954F72"/>
+      </a:folHlink>
+    </a:clrScheme>
+    <a:fontScheme name="Office">
+      <a:majorFont>
+        <a:latin typeface="Calibri Light" panose="020F0302020204030204"/>
+        <a:ea typeface=""/>
+        <a:cs typeface=""/>
+        <a:font script="Jpan" typeface="ＭＳ Ｐゴシック"/>
+        <a:font script="Hang" typeface="맑은 고딕"/>
+        <a:font script="Hans" typeface="宋体"/>
+        <a:font script="Hant" typeface="新細明體"/>
+        <a:font script="Arab" typeface="Times New Roman"/>
+        <a:font script="Hebr" typeface="Times New Roman"/>
+        <a:font script="Thai" typeface="Angsana New"/>
+        <a:font script="Ethi" typeface="Nyala"/>
+        <a:font script="Beng" typeface="Vrinda"/>
+        <a:font script="Gujr" typeface="Shruti"/>
+        <a:font script="Khmr" typeface="MoolBoran"/>
+        <a:font script="Knda" typeface="Tunga"/>
+        <a:font script="Guru" typeface="Raavi"/>
+        <a:font script="Cans" typeface="Euphemia"/>
+        <a:font script="Cher" typeface="Plantagenet Cherokee"/>
+        <a:font script="Yiii" typeface="Microsoft Yi Baiti"/>
+        <a:font script="Tibt" typeface="Microsoft Himalaya"/>
+        <a:font script="Thaa" typeface="MV Boli"/>
+        <a:font script="Deva" typeface="Mangal"/>
+        <a:font script="Telu" typeface="Gautami"/>
+        <a:font script="Taml" typeface="Latha"/>
+        <a:font script="Syrc" typeface="Estrangelo Edessa"/>
+        <a:font script="Orya" typeface="Kalinga"/>
+        <a:font script="Mlym" typeface="Kartika"/>
+        <a:font script="Laoo" typeface="DokChampa"/>
+        <a:font script="Sinh" typeface="Iskoola Pota"/>
+        <a:font script="Mong" typeface="Mongolian Baiti"/>
+        <a:font script="Viet" typeface="Times New Roman"/>
+        <a:font script="Uigh" typeface="Microsoft Uighur"/>
+        <a:font script="Geor" typeface="Sylfaen"/>
+      </a:majorFont>
+      <a:minorFont>
+        <a:latin typeface="Calibri" panose="020F0502020204030204"/>
+        <a:ea typeface=""/>
+        <a:cs typeface=""/>
+        <a:font script="Jpan" typeface="ＭＳ Ｐゴシック"/>
+        <a:font script="Hang" typeface="맑은 고딕"/>
+        <a:font script="Hans" typeface="宋体"/>
+        <a:font script="Hant" typeface="新細明體"/>
+        <a:font script="Arab" typeface="Arial"/>
+        <a:font script="Hebr" typeface="Arial"/>
+        <a:font script="Thai" typeface="Cordia New"/>
+        <a:font script="Ethi" typeface="Nyala"/>
+        <a:font script="Beng" typeface="Vrinda"/>
+        <a:font script="Gujr" typeface="Shruti"/>
+        <a:font script="Khmr" typeface="DaunPenh"/>
+        <a:font script="Knda" typeface="Tunga"/>
+        <a:font script="Guru" typeface="Raavi"/>
+        <a:font script="Cans" typeface="Euphemia"/>
+        <a:font script="Cher" typeface="Plantagenet Cherokee"/>
+        <a:font script="Yiii" typeface="Microsoft Yi Baiti"/>
+        <a:font script="Tibt" typeface="Microsoft Himalaya"/>
+        <a:font script="Thaa" typeface="MV Boli"/>
+        <a:font script="Deva" typeface="Mangal"/>
+        <a:font script="Telu" typeface="Gautami"/>
+        <a:font script="Taml" typeface="Latha"/>
+        <a:font script="Syrc" typeface="Estrangelo Edessa"/>
+        <a:font script="Orya" typeface="Kalinga"/>
+        <a:font script="Mlym" typeface="Kartika"/>
+        <a:font script="Laoo" typeface="DokChampa"/>
+        <a:font script="Sinh" typeface="Iskoola Pota"/>
+        <a:font script="Mong" typeface="Mongolian Baiti"/>
+        <a:font script="Viet" typeface="Arial"/>
+        <a:font script="Uigh" typeface="Microsoft Uighur"/>
+        <a:font script="Geor" typeface="Sylfaen"/>
+      </a:minorFont>
+    </a:fontScheme>
+    <a:fmtScheme name="Office">
+      <a:fillStyleLst>
+        <a:solidFill>
+          <a:schemeClr val="phClr"/>
+        </a:solidFill>
+        <a:gradFill rotWithShape="1">
+          <a:gsLst>
+            <a:gs pos="0">
+              <a:schemeClr val="phClr">
+                <a:lumMod val="110000"/>
+                <a:satMod val="105000"/>
+                <a:tint val="67000"/>
+              </a:schemeClr>
+            </a:gs>
+            <a:gs pos="50000">
+              <a:schemeClr val="phClr">
+                <a:lumMod val="105000"/>
+                <a:satMod val="103000"/>
+                <a:tint val="73000"/>
+              </a:schemeClr>
+            </a:gs>
+            <a:gs pos="100000">
+              <a:schemeClr val="phClr">
+                <a:lumMod val="105000"/>
+                <a:satMod val="109000"/>
+                <a:tint val="81000"/>
+              </a:schemeClr>
+            </a:gs>
+          </a:gsLst>
+          <a:lin ang="5400000" scaled="0"/>
+        </a:gradFill>
+        <a:gradFill rotWithShape="1">
+          <a:gsLst>
+            <a:gs pos="0">
+              <a:schemeClr val="phClr">
+                <a:satMod val="103000"/>
+                <a:lumMod val="102000"/>
+                <a:tint val="94000"/>
+              </a:schemeClr>
+            </a:gs>
+            <a:gs pos="50000">
+              <a:schemeClr val="phClr">
+                <a:satMod val="110000"/>
+                <a:lumMod val="100000"/>
+                <a:shade val="100000"/>
+              </a:schemeClr>
+            </a:gs>
+            <a:gs pos="100000">
+              <a:schemeClr val="phClr">
+                <a:lumMod val="99000"/>
+                <a:satMod val="120000"/>
+                <a:shade val="78000"/>
+              </a:schemeClr>
+            </a:gs>
+          </a:gsLst>
+          <a:lin ang="5400000" scaled="0"/>
+        </a:gradFill>
+      </a:fillStyleLst>
+      <a:lnStyleLst>
+        <a:ln w="6350" cap="flat" cmpd="sng" algn="ctr">
+          <a:solidFill>
+            <a:schemeClr val="phClr"/>
+          </a:solidFill>
+          <a:prstDash val="solid"/>
+          <a:miter lim="800000"/>
+        </a:ln>
+        <a:ln w="12700" cap="flat" cmpd="sng" algn="ctr">
+          <a:solidFill>
+            <a:schemeClr val="phClr"/>
+          </a:solidFill>
+          <a:prstDash val="solid"/>
+          <a:miter lim="800000"/>
+        </a:ln>
+        <a:ln w="19050" cap="flat" cmpd="sng" algn="ctr">
+          <a:solidFill>
+            <a:schemeClr val="phClr"/>
+          </a:solidFill>
+          <a:prstDash val="solid"/>
+          <a:miter lim="800000"/>
+        </a:ln>
+      </a:lnStyleLst>
+      <a:effectStyleLst>
+        <a:effectStyle>
+          <a:effectLst/>
+        </a:effectStyle>
+        <a:effectStyle>
+          <a:effectLst/>
+        </a:effectStyle>
+        <a:effectStyle>
+          <a:effectLst>
+            <a:outerShdw blurRad="57150" dist="19050" dir="5400000" algn="ctr" rotWithShape="0">
+              <a:srgbClr val="000000">
+                <a:alpha val="63000"/>
+              </a:srgbClr>
+            </a:outerShdw>
+          </a:effectLst>
+        </a:effectStyle>
+      </a:effectStyleLst>
+      <a:bgFillStyleLst>
+        <a:solidFill>
+          <a:schemeClr val="phClr"/>
+        </a:solidFill>
+        <a:solidFill>
+          <a:schemeClr val="phClr">
+            <a:tint val="95000"/>
+            <a:satMod val="170000"/>
+          </a:schemeClr>
+        </a:solidFill>
+        <a:gradFill rotWithShape="1">
+          <a:gsLst>
+            <a:gs pos="0">
+              <a:schemeClr val="phClr">
+                <a:tint val="93000"/>
+                <a:satMod val="150000"/>
+                <a:shade val="98000"/>
+                <a:lumMod val="102000"/>
+              </a:schemeClr>
+            </a:gs>
+            <a:gs pos="50000">
+              <a:schemeClr val="phClr">
+                <a:tint val="98000"/>
+                <a:satMod val="130000"/>
+                <a:shade val="90000"/>
+                <a:lumMod val="103000"/>
+              </a:schemeClr>
+            </a:gs>
+            <a:gs pos="100000">
+              <a:schemeClr val="phClr">
+                <a:shade val="63000"/>
+                <a:satMod val="120000"/>
+              </a:schemeClr>
+            </a:gs>
+          </a:gsLst>
+          <a:lin ang="5400000" scaled="0"/>
+        </a:gradFill>
+      </a:bgFillStyleLst>
+    </a:fmtScheme>
+  </a:themeElements>
+  <a:objectDefaults/>
+  <a:extraClrSchemeLst/>
+  <a:extLst>
+    <a:ext uri="{05A4C25C-085E-4340-85A3-A5531E510DB2}">
+      <thm15:themeFamily xmlns:thm15="http://schemas.microsoft.com/office/thememl/2012/main" name="Office Theme" id="{62F939B6-93AF-4DB8-9C6B-D6C7DFDC589F}" vid="{4A3C46E8-61CC-4603-A589-7422A47A8E4A}"/>
+    </a:ext>
+  </a:extLst>
+</a:theme>
 </file>
</xml_diff>